<commit_message>
Añadida la diapositiva"Principios Software usados"
* Si tienes algo que añadir, ¡añádelo!
</commit_message>
<xml_diff>
--- a/docs/IntroIngSoft.PresentacionesFinales.pptx
+++ b/docs/IntroIngSoft.PresentacionesFinales.pptx
@@ -9915,9 +9915,8 @@
             <a:pPr lvl="1"/>
             <a:r>
               <a:rPr lang="es-ES" dirty="0" smtClean="0"/>
-              <a:t>Patrones/Principios // Comentario: Usamos el principio Abierto-Cerrado</a:t>
-            </a:r>
-            <a:endParaRPr lang="es-ES" dirty="0" smtClean="0"/>
+              <a:t>Patrones/Principios </a:t>
+            </a:r>
           </a:p>
           <a:p>
             <a:pPr lvl="1"/>
@@ -9925,6 +9924,7 @@
               <a:rPr lang="es-ES" dirty="0" smtClean="0"/>
               <a:t>Pruebas</a:t>
             </a:r>
+            <a:endParaRPr lang="es-ES" dirty="0" smtClean="0"/>
           </a:p>
           <a:p>
             <a:r>
@@ -11030,6 +11030,22 @@
           <a:bodyPr/>
           <a:lstStyle/>
           <a:p>
+            <a:r>
+              <a:rPr lang="es-ES" dirty="0"/>
+              <a:t>Actividades de Ing. </a:t>
+            </a:r>
+            <a:r>
+              <a:rPr lang="es-ES" dirty="0" err="1"/>
+              <a:t>Sw</a:t>
+            </a:r>
+            <a:r>
+              <a:rPr lang="es-ES" dirty="0"/>
+              <a:t> - </a:t>
+            </a:r>
+            <a:r>
+              <a:rPr lang="es-ES" dirty="0" smtClean="0"/>
+              <a:t>Principios</a:t>
+            </a:r>
             <a:endParaRPr lang="en-US" noProof="0" dirty="0"/>
           </a:p>
         </p:txBody>
@@ -11071,6 +11087,22 @@
         <p:txBody>
           <a:bodyPr/>
           <a:lstStyle/>
+          <a:p>
+            <a:r>
+              <a:rPr lang="es-ES" dirty="0" smtClean="0"/>
+              <a:t>Hacemos uso del Principio Abierto-Cerrado, el proyecto está abierto para expansión.</a:t>
+            </a:r>
+          </a:p>
+          <a:p>
+            <a:r>
+              <a:rPr lang="es-ES" dirty="0" smtClean="0"/>
+              <a:t>Posibles nuevas funcionalidades: Más parámetros para calcular la dieta, mostrar un precio aproximado al dar </a:t>
+            </a:r>
+            <a:r>
+              <a:rPr lang="es-ES" smtClean="0"/>
+              <a:t>la dieta</a:t>
+            </a:r>
+          </a:p>
           <a:p>
             <a:endParaRPr lang="es-ES" dirty="0"/>
           </a:p>

</xml_diff>

<commit_message>
Agregadas unas 3 o 4 diapositivas más.
</commit_message>
<xml_diff>
--- a/docs/IntroIngSoft.PresentacionesFinales.pptx
+++ b/docs/IntroIngSoft.PresentacionesFinales.pptx
@@ -19,8 +19,8 @@
     <p:sldId id="262" r:id="rId7"/>
     <p:sldId id="263" r:id="rId8"/>
     <p:sldId id="264" r:id="rId9"/>
-    <p:sldId id="265" r:id="rId10"/>
-    <p:sldId id="266" r:id="rId11"/>
+    <p:sldId id="266" r:id="rId10"/>
+    <p:sldId id="265" r:id="rId11"/>
     <p:sldId id="267" r:id="rId12"/>
     <p:sldId id="268" r:id="rId13"/>
     <p:sldId id="269" r:id="rId14"/>
@@ -232,7 +232,7 @@
             <a:fld id="{0252902A-18E7-6440-A09B-741E2A2B6D42}" type="datetimeFigureOut">
               <a:rPr lang="es-ES" smtClean="0"/>
               <a:pPr/>
-              <a:t>30/05/2018</a:t>
+              <a:t>03/06/2018</a:t>
             </a:fld>
             <a:endParaRPr lang="es-ES"/>
           </a:p>
@@ -400,7 +400,7 @@
             <a:fld id="{4FA7064A-13DB-A34E-B31E-2D0AF10C5A7A}" type="datetimeFigureOut">
               <a:rPr lang="es-ES" smtClean="0"/>
               <a:pPr/>
-              <a:t>30/05/2018</a:t>
+              <a:t>03/06/2018</a:t>
             </a:fld>
             <a:endParaRPr lang="es-ES"/>
           </a:p>
@@ -464,35 +464,35 @@
           <a:p>
             <a:pPr lvl="0"/>
             <a:r>
-              <a:rPr lang="es-ES_tradnl" smtClean="0"/>
+              <a:rPr lang="es-ES_tradnl"/>
               <a:t>Haga clic para modificar el estilo de texto del patrón</a:t>
             </a:r>
           </a:p>
           <a:p>
             <a:pPr lvl="1"/>
             <a:r>
-              <a:rPr lang="es-ES_tradnl" smtClean="0"/>
+              <a:rPr lang="es-ES_tradnl"/>
               <a:t>Segundo nivel</a:t>
             </a:r>
           </a:p>
           <a:p>
             <a:pPr lvl="2"/>
             <a:r>
-              <a:rPr lang="es-ES_tradnl" smtClean="0"/>
+              <a:rPr lang="es-ES_tradnl"/>
               <a:t>Tercer nivel</a:t>
             </a:r>
           </a:p>
           <a:p>
             <a:pPr lvl="3"/>
             <a:r>
-              <a:rPr lang="es-ES_tradnl" smtClean="0"/>
+              <a:rPr lang="es-ES_tradnl"/>
               <a:t>Cuarto nivel</a:t>
             </a:r>
           </a:p>
           <a:p>
             <a:pPr lvl="4"/>
             <a:r>
-              <a:rPr lang="es-ES_tradnl" smtClean="0"/>
+              <a:rPr lang="es-ES_tradnl"/>
               <a:t>Quinto nivel</a:t>
             </a:r>
             <a:endParaRPr lang="es-ES"/>
@@ -2727,7 +2727,7 @@
           </a:lstStyle>
           <a:p>
             <a:r>
-              <a:rPr kumimoji="0" lang="es-ES_tradnl" smtClean="0"/>
+              <a:rPr kumimoji="0" lang="es-ES_tradnl"/>
               <a:t>Haga clic para modificar el estilo de subtítulo del patrón</a:t>
             </a:r>
             <a:endParaRPr kumimoji="0" lang="en-US"/>
@@ -2751,7 +2751,7 @@
           <a:p>
             <a:pPr eaLnBrk="1" latinLnBrk="0" hangingPunct="1"/>
             <a:r>
-              <a:rPr lang="es-ES_tradnl" smtClean="0"/>
+              <a:rPr lang="es-ES_tradnl"/>
               <a:t>2017-2018</a:t>
             </a:r>
             <a:endParaRPr lang="en-US"/>
@@ -2774,10 +2774,9 @@
           <a:lstStyle/>
           <a:p>
             <a:r>
-              <a:rPr kumimoji="0" lang="en-US" smtClean="0"/>
+              <a:rPr kumimoji="0" lang="en-US"/>
               <a:t>Introduction to Software Engineering</a:t>
             </a:r>
-            <a:endParaRPr kumimoji="0" lang="en-US"/>
           </a:p>
         </p:txBody>
       </p:sp>
@@ -3028,7 +3027,7 @@
           </a:lstStyle>
           <a:p>
             <a:r>
-              <a:rPr kumimoji="0" lang="es-ES_tradnl" smtClean="0"/>
+              <a:rPr kumimoji="0" lang="es-ES_tradnl"/>
               <a:t>Clic para editar título</a:t>
             </a:r>
             <a:endParaRPr kumimoji="0" lang="en-US"/>
@@ -3083,13 +3082,6 @@
     <a:masterClrMapping/>
   </p:clrMapOvr>
   <p:transition advClick="0" advTm="20000"/>
-  <p:timing>
-    <p:tnLst>
-      <p:par>
-        <p:cTn id="1" dur="indefinite" restart="never" nodeType="tmRoot"/>
-      </p:par>
-    </p:tnLst>
-  </p:timing>
 </p:sldLayout>
 </file>
 
@@ -3126,7 +3118,7 @@
           <a:lstStyle/>
           <a:p>
             <a:r>
-              <a:rPr kumimoji="0" lang="es-ES_tradnl" smtClean="0"/>
+              <a:rPr kumimoji="0" lang="es-ES_tradnl"/>
               <a:t>Clic para editar título</a:t>
             </a:r>
             <a:endParaRPr kumimoji="0" lang="en-US"/>
@@ -3150,35 +3142,35 @@
           <a:p>
             <a:pPr lvl="0" eaLnBrk="1" latinLnBrk="0" hangingPunct="1"/>
             <a:r>
-              <a:rPr lang="es-ES_tradnl" smtClean="0"/>
+              <a:rPr lang="es-ES_tradnl"/>
               <a:t>Haga clic para modificar el estilo de texto del patrón</a:t>
             </a:r>
           </a:p>
           <a:p>
             <a:pPr lvl="1" eaLnBrk="1" latinLnBrk="0" hangingPunct="1"/>
             <a:r>
-              <a:rPr lang="es-ES_tradnl" smtClean="0"/>
+              <a:rPr lang="es-ES_tradnl"/>
               <a:t>Segundo nivel</a:t>
             </a:r>
           </a:p>
           <a:p>
             <a:pPr lvl="2" eaLnBrk="1" latinLnBrk="0" hangingPunct="1"/>
             <a:r>
-              <a:rPr lang="es-ES_tradnl" smtClean="0"/>
+              <a:rPr lang="es-ES_tradnl"/>
               <a:t>Tercer nivel</a:t>
             </a:r>
           </a:p>
           <a:p>
             <a:pPr lvl="3" eaLnBrk="1" latinLnBrk="0" hangingPunct="1"/>
             <a:r>
-              <a:rPr lang="es-ES_tradnl" smtClean="0"/>
+              <a:rPr lang="es-ES_tradnl"/>
               <a:t>Cuarto nivel</a:t>
             </a:r>
           </a:p>
           <a:p>
             <a:pPr lvl="4" eaLnBrk="1" latinLnBrk="0" hangingPunct="1"/>
             <a:r>
-              <a:rPr lang="es-ES_tradnl" smtClean="0"/>
+              <a:rPr lang="es-ES_tradnl"/>
               <a:t>Quinto nivel</a:t>
             </a:r>
             <a:endParaRPr kumimoji="0" lang="en-US"/>
@@ -3201,7 +3193,7 @@
           <a:lstStyle/>
           <a:p>
             <a:r>
-              <a:rPr lang="es-ES_tradnl" smtClean="0"/>
+              <a:rPr lang="es-ES_tradnl"/>
               <a:t>2017-2018</a:t>
             </a:r>
             <a:endParaRPr lang="en-US"/>
@@ -3224,10 +3216,9 @@
           <a:lstStyle/>
           <a:p>
             <a:r>
-              <a:rPr lang="en-US" smtClean="0"/>
+              <a:rPr lang="en-US"/>
               <a:t>Introduction to Software Engineering</a:t>
             </a:r>
-            <a:endParaRPr lang="en-US"/>
           </a:p>
         </p:txBody>
       </p:sp>
@@ -3684,35 +3675,35 @@
           <a:p>
             <a:pPr lvl="0" eaLnBrk="1" latinLnBrk="0" hangingPunct="1"/>
             <a:r>
-              <a:rPr lang="es-ES_tradnl" smtClean="0"/>
+              <a:rPr lang="es-ES_tradnl"/>
               <a:t>Haga clic para modificar el estilo de texto del patrón</a:t>
             </a:r>
           </a:p>
           <a:p>
             <a:pPr lvl="1" eaLnBrk="1" latinLnBrk="0" hangingPunct="1"/>
             <a:r>
-              <a:rPr lang="es-ES_tradnl" smtClean="0"/>
+              <a:rPr lang="es-ES_tradnl"/>
               <a:t>Segundo nivel</a:t>
             </a:r>
           </a:p>
           <a:p>
             <a:pPr lvl="2" eaLnBrk="1" latinLnBrk="0" hangingPunct="1"/>
             <a:r>
-              <a:rPr lang="es-ES_tradnl" smtClean="0"/>
+              <a:rPr lang="es-ES_tradnl"/>
               <a:t>Tercer nivel</a:t>
             </a:r>
           </a:p>
           <a:p>
             <a:pPr lvl="3" eaLnBrk="1" latinLnBrk="0" hangingPunct="1"/>
             <a:r>
-              <a:rPr lang="es-ES_tradnl" smtClean="0"/>
+              <a:rPr lang="es-ES_tradnl"/>
               <a:t>Cuarto nivel</a:t>
             </a:r>
           </a:p>
           <a:p>
             <a:pPr lvl="4" eaLnBrk="1" latinLnBrk="0" hangingPunct="1"/>
             <a:r>
-              <a:rPr lang="es-ES_tradnl" smtClean="0"/>
+              <a:rPr lang="es-ES_tradnl"/>
               <a:t>Quinto nivel</a:t>
             </a:r>
             <a:endParaRPr kumimoji="0" lang="en-US"/>
@@ -3735,7 +3726,7 @@
           <a:lstStyle/>
           <a:p>
             <a:r>
-              <a:rPr lang="es-ES_tradnl" smtClean="0"/>
+              <a:rPr lang="es-ES_tradnl"/>
               <a:t>2017-2018</a:t>
             </a:r>
             <a:endParaRPr lang="en-US"/>
@@ -3758,10 +3749,9 @@
           <a:lstStyle/>
           <a:p>
             <a:r>
-              <a:rPr lang="en-US" smtClean="0"/>
+              <a:rPr lang="en-US"/>
               <a:t>Introduction to Software Engineering</a:t>
             </a:r>
-            <a:endParaRPr lang="en-US"/>
           </a:p>
         </p:txBody>
       </p:sp>
@@ -3786,7 +3776,7 @@
           <a:lstStyle/>
           <a:p>
             <a:r>
-              <a:rPr kumimoji="0" lang="es-ES_tradnl" smtClean="0"/>
+              <a:rPr kumimoji="0" lang="es-ES_tradnl"/>
               <a:t>Clic para editar título</a:t>
             </a:r>
             <a:endParaRPr kumimoji="0" lang="en-US"/>
@@ -3845,7 +3835,7 @@
           </a:lstStyle>
           <a:p>
             <a:r>
-              <a:rPr kumimoji="0" lang="es-ES_tradnl" smtClean="0"/>
+              <a:rPr kumimoji="0" lang="es-ES_tradnl"/>
               <a:t>Clic para editar título</a:t>
             </a:r>
             <a:endParaRPr kumimoji="0" lang="en-US"/>
@@ -3868,7 +3858,7 @@
           <a:lstStyle/>
           <a:p>
             <a:r>
-              <a:rPr lang="en-US" smtClean="0"/>
+              <a:rPr lang="en-US"/>
               <a:t>Introduction to Software Engineering</a:t>
             </a:r>
             <a:endParaRPr lang="en-US" dirty="0"/>
@@ -3926,35 +3916,35 @@
           <a:p>
             <a:pPr lvl="0" eaLnBrk="1" latinLnBrk="0" hangingPunct="1"/>
             <a:r>
-              <a:rPr lang="es-ES_tradnl" dirty="0" smtClean="0"/>
+              <a:rPr lang="es-ES_tradnl" dirty="0"/>
               <a:t>Haga clic para modificar el estilo de texto del patrón</a:t>
             </a:r>
           </a:p>
           <a:p>
             <a:pPr lvl="1" eaLnBrk="1" latinLnBrk="0" hangingPunct="1"/>
             <a:r>
-              <a:rPr lang="es-ES_tradnl" dirty="0" smtClean="0"/>
+              <a:rPr lang="es-ES_tradnl" dirty="0"/>
               <a:t>Segundo nivel</a:t>
             </a:r>
           </a:p>
           <a:p>
             <a:pPr lvl="2" eaLnBrk="1" latinLnBrk="0" hangingPunct="1"/>
             <a:r>
-              <a:rPr lang="es-ES_tradnl" dirty="0" smtClean="0"/>
+              <a:rPr lang="es-ES_tradnl" dirty="0"/>
               <a:t>Tercer nivel</a:t>
             </a:r>
           </a:p>
           <a:p>
             <a:pPr lvl="3" eaLnBrk="1" latinLnBrk="0" hangingPunct="1"/>
             <a:r>
-              <a:rPr lang="es-ES_tradnl" dirty="0" smtClean="0"/>
+              <a:rPr lang="es-ES_tradnl" dirty="0"/>
               <a:t>Cuarto nivel</a:t>
             </a:r>
           </a:p>
           <a:p>
             <a:pPr lvl="4" eaLnBrk="1" latinLnBrk="0" hangingPunct="1"/>
             <a:r>
-              <a:rPr lang="es-ES_tradnl" dirty="0" smtClean="0"/>
+              <a:rPr lang="es-ES_tradnl" dirty="0"/>
               <a:t>Quinto nivel</a:t>
             </a:r>
             <a:endParaRPr kumimoji="0" lang="en-US" dirty="0"/>
@@ -3993,7 +3983,7 @@
           </a:lstStyle>
           <a:p>
             <a:r>
-              <a:rPr lang="es-ES_tradnl" smtClean="0"/>
+              <a:rPr lang="es-ES_tradnl"/>
               <a:t>2017-2018</a:t>
             </a:r>
             <a:endParaRPr lang="en-US" dirty="0"/>
@@ -4006,13 +3996,6 @@
     <a:masterClrMapping/>
   </p:clrMapOvr>
   <p:transition advClick="0" advTm="20000"/>
-  <p:timing>
-    <p:tnLst>
-      <p:par>
-        <p:cTn id="1" dur="indefinite" restart="never" nodeType="tmRoot"/>
-      </p:par>
-    </p:tnLst>
-  </p:timing>
 </p:sldLayout>
 </file>
 
@@ -4320,7 +4303,7 @@
           <a:p>
             <a:pPr lvl="0" eaLnBrk="1" latinLnBrk="0" hangingPunct="1"/>
             <a:r>
-              <a:rPr kumimoji="0" lang="es-ES_tradnl" smtClean="0"/>
+              <a:rPr kumimoji="0" lang="es-ES_tradnl"/>
               <a:t>Haga clic para modificar el estilo de texto del patrón</a:t>
             </a:r>
           </a:p>
@@ -4416,10 +4399,9 @@
           <a:lstStyle/>
           <a:p>
             <a:r>
-              <a:rPr kumimoji="0" lang="en-US" smtClean="0"/>
+              <a:rPr kumimoji="0" lang="en-US"/>
               <a:t>Introduction to Software Engineering</a:t>
             </a:r>
-            <a:endParaRPr kumimoji="0" lang="en-US"/>
           </a:p>
         </p:txBody>
       </p:sp>
@@ -4440,7 +4422,7 @@
           <a:p>
             <a:pPr eaLnBrk="1" latinLnBrk="0" hangingPunct="1"/>
             <a:r>
-              <a:rPr lang="es-ES_tradnl" smtClean="0"/>
+              <a:rPr lang="es-ES_tradnl"/>
               <a:t>2017-2018</a:t>
             </a:r>
             <a:endParaRPr lang="en-US"/>
@@ -4657,7 +4639,7 @@
           </a:lstStyle>
           <a:p>
             <a:r>
-              <a:rPr kumimoji="0" lang="es-ES_tradnl" smtClean="0"/>
+              <a:rPr kumimoji="0" lang="es-ES_tradnl"/>
               <a:t>Clic para editar título</a:t>
             </a:r>
             <a:endParaRPr kumimoji="0" lang="en-US"/>
@@ -4670,13 +4652,6 @@
     <a:masterClrMapping/>
   </p:clrMapOvr>
   <p:transition advClick="0" advTm="20000"/>
-  <p:timing>
-    <p:tnLst>
-      <p:par>
-        <p:cTn id="1" dur="indefinite" restart="never" nodeType="tmRoot"/>
-      </p:par>
-    </p:tnLst>
-  </p:timing>
 </p:sldLayout>
 </file>
 
@@ -4718,7 +4693,7 @@
           <a:lstStyle/>
           <a:p>
             <a:r>
-              <a:rPr kumimoji="0" lang="es-ES_tradnl" smtClean="0"/>
+              <a:rPr kumimoji="0" lang="es-ES_tradnl"/>
               <a:t>Clic para editar título</a:t>
             </a:r>
             <a:endParaRPr kumimoji="0" lang="en-US"/>
@@ -4746,7 +4721,7 @@
           <a:lstStyle/>
           <a:p>
             <a:r>
-              <a:rPr lang="es-ES_tradnl" smtClean="0"/>
+              <a:rPr lang="es-ES_tradnl"/>
               <a:t>2017-2018</a:t>
             </a:r>
             <a:endParaRPr lang="en-US"/>
@@ -4769,10 +4744,9 @@
           <a:lstStyle/>
           <a:p>
             <a:r>
-              <a:rPr lang="en-US" smtClean="0"/>
+              <a:rPr lang="en-US"/>
               <a:t>Introduction to Software Engineering</a:t>
             </a:r>
-            <a:endParaRPr lang="en-US"/>
           </a:p>
         </p:txBody>
       </p:sp>
@@ -4862,35 +4836,35 @@
           <a:p>
             <a:pPr lvl="0" eaLnBrk="1" latinLnBrk="0" hangingPunct="1"/>
             <a:r>
-              <a:rPr lang="es-ES_tradnl" smtClean="0"/>
+              <a:rPr lang="es-ES_tradnl"/>
               <a:t>Haga clic para modificar el estilo de texto del patrón</a:t>
             </a:r>
           </a:p>
           <a:p>
             <a:pPr lvl="1" eaLnBrk="1" latinLnBrk="0" hangingPunct="1"/>
             <a:r>
-              <a:rPr lang="es-ES_tradnl" smtClean="0"/>
+              <a:rPr lang="es-ES_tradnl"/>
               <a:t>Segundo nivel</a:t>
             </a:r>
           </a:p>
           <a:p>
             <a:pPr lvl="2" eaLnBrk="1" latinLnBrk="0" hangingPunct="1"/>
             <a:r>
-              <a:rPr lang="es-ES_tradnl" smtClean="0"/>
+              <a:rPr lang="es-ES_tradnl"/>
               <a:t>Tercer nivel</a:t>
             </a:r>
           </a:p>
           <a:p>
             <a:pPr lvl="3" eaLnBrk="1" latinLnBrk="0" hangingPunct="1"/>
             <a:r>
-              <a:rPr lang="es-ES_tradnl" smtClean="0"/>
+              <a:rPr lang="es-ES_tradnl"/>
               <a:t>Cuarto nivel</a:t>
             </a:r>
           </a:p>
           <a:p>
             <a:pPr lvl="4" eaLnBrk="1" latinLnBrk="0" hangingPunct="1"/>
             <a:r>
-              <a:rPr lang="es-ES_tradnl" smtClean="0"/>
+              <a:rPr lang="es-ES_tradnl"/>
               <a:t>Quinto nivel</a:t>
             </a:r>
             <a:endParaRPr kumimoji="0" lang="en-US"/>
@@ -4923,35 +4897,35 @@
           <a:p>
             <a:pPr lvl="0" eaLnBrk="1" latinLnBrk="0" hangingPunct="1"/>
             <a:r>
-              <a:rPr lang="es-ES_tradnl" smtClean="0"/>
+              <a:rPr lang="es-ES_tradnl"/>
               <a:t>Haga clic para modificar el estilo de texto del patrón</a:t>
             </a:r>
           </a:p>
           <a:p>
             <a:pPr lvl="1" eaLnBrk="1" latinLnBrk="0" hangingPunct="1"/>
             <a:r>
-              <a:rPr lang="es-ES_tradnl" smtClean="0"/>
+              <a:rPr lang="es-ES_tradnl"/>
               <a:t>Segundo nivel</a:t>
             </a:r>
           </a:p>
           <a:p>
             <a:pPr lvl="2" eaLnBrk="1" latinLnBrk="0" hangingPunct="1"/>
             <a:r>
-              <a:rPr lang="es-ES_tradnl" smtClean="0"/>
+              <a:rPr lang="es-ES_tradnl"/>
               <a:t>Tercer nivel</a:t>
             </a:r>
           </a:p>
           <a:p>
             <a:pPr lvl="3" eaLnBrk="1" latinLnBrk="0" hangingPunct="1"/>
             <a:r>
-              <a:rPr lang="es-ES_tradnl" smtClean="0"/>
+              <a:rPr lang="es-ES_tradnl"/>
               <a:t>Cuarto nivel</a:t>
             </a:r>
           </a:p>
           <a:p>
             <a:pPr lvl="4" eaLnBrk="1" latinLnBrk="0" hangingPunct="1"/>
             <a:r>
-              <a:rPr lang="es-ES_tradnl" smtClean="0"/>
+              <a:rPr lang="es-ES_tradnl"/>
               <a:t>Quinto nivel</a:t>
             </a:r>
             <a:endParaRPr kumimoji="0" lang="en-US"/>
@@ -4964,13 +4938,6 @@
     <a:masterClrMapping/>
   </p:clrMapOvr>
   <p:transition advClick="0" advTm="20000"/>
-  <p:timing>
-    <p:tnLst>
-      <p:par>
-        <p:cTn id="1" dur="indefinite" restart="never" nodeType="tmRoot"/>
-      </p:par>
-    </p:tnLst>
-  </p:timing>
 </p:sldLayout>
 </file>
 
@@ -5321,7 +5288,7 @@
           <a:p>
             <a:pPr lvl="0" eaLnBrk="1" latinLnBrk="0" hangingPunct="1"/>
             <a:r>
-              <a:rPr kumimoji="0" lang="es-ES_tradnl" smtClean="0"/>
+              <a:rPr kumimoji="0" lang="es-ES_tradnl"/>
               <a:t>Haga clic para modificar el estilo de texto del patrón</a:t>
             </a:r>
           </a:p>
@@ -5391,7 +5358,7 @@
           <a:p>
             <a:pPr lvl="0" eaLnBrk="1" latinLnBrk="0" hangingPunct="1"/>
             <a:r>
-              <a:rPr kumimoji="0" lang="es-ES_tradnl" smtClean="0"/>
+              <a:rPr kumimoji="0" lang="es-ES_tradnl"/>
               <a:t>Haga clic para modificar el estilo de texto del patrón</a:t>
             </a:r>
           </a:p>
@@ -5413,7 +5380,7 @@
           <a:lstStyle/>
           <a:p>
             <a:r>
-              <a:rPr lang="es-ES_tradnl" smtClean="0"/>
+              <a:rPr lang="es-ES_tradnl"/>
               <a:t>2017-2018</a:t>
             </a:r>
             <a:endParaRPr lang="en-US"/>
@@ -5441,10 +5408,9 @@
           <a:lstStyle/>
           <a:p>
             <a:r>
-              <a:rPr lang="en-US" smtClean="0"/>
+              <a:rPr lang="en-US"/>
               <a:t>Introduction to Software Engineering</a:t>
             </a:r>
-            <a:endParaRPr lang="en-US"/>
           </a:p>
         </p:txBody>
       </p:sp>
@@ -5546,35 +5512,35 @@
           <a:p>
             <a:pPr lvl="0" eaLnBrk="1" latinLnBrk="0" hangingPunct="1"/>
             <a:r>
-              <a:rPr lang="es-ES_tradnl" smtClean="0"/>
+              <a:rPr lang="es-ES_tradnl"/>
               <a:t>Haga clic para modificar el estilo de texto del patrón</a:t>
             </a:r>
           </a:p>
           <a:p>
             <a:pPr lvl="1" eaLnBrk="1" latinLnBrk="0" hangingPunct="1"/>
             <a:r>
-              <a:rPr lang="es-ES_tradnl" smtClean="0"/>
+              <a:rPr lang="es-ES_tradnl"/>
               <a:t>Segundo nivel</a:t>
             </a:r>
           </a:p>
           <a:p>
             <a:pPr lvl="2" eaLnBrk="1" latinLnBrk="0" hangingPunct="1"/>
             <a:r>
-              <a:rPr lang="es-ES_tradnl" smtClean="0"/>
+              <a:rPr lang="es-ES_tradnl"/>
               <a:t>Tercer nivel</a:t>
             </a:r>
           </a:p>
           <a:p>
             <a:pPr lvl="3" eaLnBrk="1" latinLnBrk="0" hangingPunct="1"/>
             <a:r>
-              <a:rPr lang="es-ES_tradnl" smtClean="0"/>
+              <a:rPr lang="es-ES_tradnl"/>
               <a:t>Cuarto nivel</a:t>
             </a:r>
           </a:p>
           <a:p>
             <a:pPr lvl="4" eaLnBrk="1" latinLnBrk="0" hangingPunct="1"/>
             <a:r>
-              <a:rPr lang="es-ES_tradnl" smtClean="0"/>
+              <a:rPr lang="es-ES_tradnl"/>
               <a:t>Quinto nivel</a:t>
             </a:r>
             <a:endParaRPr kumimoji="0" lang="en-US"/>
@@ -5603,35 +5569,35 @@
           <a:p>
             <a:pPr lvl="0" eaLnBrk="1" latinLnBrk="0" hangingPunct="1"/>
             <a:r>
-              <a:rPr lang="es-ES_tradnl" smtClean="0"/>
+              <a:rPr lang="es-ES_tradnl"/>
               <a:t>Haga clic para modificar el estilo de texto del patrón</a:t>
             </a:r>
           </a:p>
           <a:p>
             <a:pPr lvl="1" eaLnBrk="1" latinLnBrk="0" hangingPunct="1"/>
             <a:r>
-              <a:rPr lang="es-ES_tradnl" smtClean="0"/>
+              <a:rPr lang="es-ES_tradnl"/>
               <a:t>Segundo nivel</a:t>
             </a:r>
           </a:p>
           <a:p>
             <a:pPr lvl="2" eaLnBrk="1" latinLnBrk="0" hangingPunct="1"/>
             <a:r>
-              <a:rPr lang="es-ES_tradnl" smtClean="0"/>
+              <a:rPr lang="es-ES_tradnl"/>
               <a:t>Tercer nivel</a:t>
             </a:r>
           </a:p>
           <a:p>
             <a:pPr lvl="3" eaLnBrk="1" latinLnBrk="0" hangingPunct="1"/>
             <a:r>
-              <a:rPr lang="es-ES_tradnl" smtClean="0"/>
+              <a:rPr lang="es-ES_tradnl"/>
               <a:t>Cuarto nivel</a:t>
             </a:r>
           </a:p>
           <a:p>
             <a:pPr lvl="4" eaLnBrk="1" latinLnBrk="0" hangingPunct="1"/>
             <a:r>
-              <a:rPr lang="es-ES_tradnl" smtClean="0"/>
+              <a:rPr lang="es-ES_tradnl"/>
               <a:t>Quinto nivel</a:t>
             </a:r>
             <a:endParaRPr kumimoji="0" lang="en-US"/>
@@ -5783,7 +5749,7 @@
           <a:lstStyle/>
           <a:p>
             <a:r>
-              <a:rPr kumimoji="0" lang="es-ES_tradnl" smtClean="0"/>
+              <a:rPr kumimoji="0" lang="es-ES_tradnl"/>
               <a:t>Clic para editar título</a:t>
             </a:r>
             <a:endParaRPr kumimoji="0" lang="en-US"/>
@@ -5796,13 +5762,6 @@
     <a:masterClrMapping/>
   </p:clrMapOvr>
   <p:transition advClick="0" advTm="20000"/>
-  <p:timing>
-    <p:tnLst>
-      <p:par>
-        <p:cTn id="1" dur="indefinite" restart="never" nodeType="tmRoot"/>
-      </p:par>
-    </p:tnLst>
-  </p:timing>
 </p:sldLayout>
 </file>
 
@@ -5839,7 +5798,7 @@
           <a:lstStyle/>
           <a:p>
             <a:r>
-              <a:rPr kumimoji="0" lang="es-ES_tradnl" smtClean="0"/>
+              <a:rPr kumimoji="0" lang="es-ES_tradnl"/>
               <a:t>Clic para editar título</a:t>
             </a:r>
             <a:endParaRPr kumimoji="0" lang="en-US"/>
@@ -5862,7 +5821,7 @@
           <a:lstStyle/>
           <a:p>
             <a:r>
-              <a:rPr lang="es-ES_tradnl" smtClean="0"/>
+              <a:rPr lang="es-ES_tradnl"/>
               <a:t>2017-2018</a:t>
             </a:r>
             <a:endParaRPr lang="en-US"/>
@@ -5885,10 +5844,9 @@
           <a:lstStyle/>
           <a:p>
             <a:r>
-              <a:rPr lang="en-US" smtClean="0"/>
+              <a:rPr lang="en-US"/>
               <a:t>Introduction to Software Engineering</a:t>
             </a:r>
-            <a:endParaRPr lang="en-US"/>
           </a:p>
         </p:txBody>
       </p:sp>
@@ -5927,13 +5885,6 @@
     <a:masterClrMapping/>
   </p:clrMapOvr>
   <p:transition advClick="0" advTm="20000"/>
-  <p:timing>
-    <p:tnLst>
-      <p:par>
-        <p:cTn id="1" dur="indefinite" restart="never" nodeType="tmRoot"/>
-      </p:par>
-    </p:tnLst>
-  </p:timing>
 </p:sldLayout>
 </file>
 
@@ -6188,7 +6139,7 @@
           <a:lstStyle/>
           <a:p>
             <a:r>
-              <a:rPr lang="es-ES_tradnl" smtClean="0"/>
+              <a:rPr lang="es-ES_tradnl"/>
               <a:t>2017-2018</a:t>
             </a:r>
             <a:endParaRPr lang="en-US"/>
@@ -6211,10 +6162,9 @@
           <a:lstStyle/>
           <a:p>
             <a:r>
-              <a:rPr lang="en-US" smtClean="0"/>
+              <a:rPr lang="en-US"/>
               <a:t>Introduction to Software Engineering</a:t>
             </a:r>
-            <a:endParaRPr lang="en-US"/>
           </a:p>
         </p:txBody>
       </p:sp>
@@ -6539,7 +6489,7 @@
           </a:lstStyle>
           <a:p>
             <a:r>
-              <a:rPr kumimoji="0" lang="es-ES_tradnl" smtClean="0"/>
+              <a:rPr kumimoji="0" lang="es-ES_tradnl"/>
               <a:t>Clic para editar título</a:t>
             </a:r>
             <a:endParaRPr kumimoji="0" lang="en-US"/>
@@ -6596,7 +6546,7 @@
           <a:p>
             <a:pPr lvl="0" eaLnBrk="1" latinLnBrk="0" hangingPunct="1"/>
             <a:r>
-              <a:rPr kumimoji="0" lang="es-ES_tradnl" smtClean="0"/>
+              <a:rPr kumimoji="0" lang="es-ES_tradnl"/>
               <a:t>Haga clic para modificar el estilo de texto del patrón</a:t>
             </a:r>
           </a:p>
@@ -6700,35 +6650,35 @@
           <a:p>
             <a:pPr lvl="0" eaLnBrk="1" latinLnBrk="0" hangingPunct="1"/>
             <a:r>
-              <a:rPr lang="es-ES_tradnl" smtClean="0"/>
+              <a:rPr lang="es-ES_tradnl"/>
               <a:t>Haga clic para modificar el estilo de texto del patrón</a:t>
             </a:r>
           </a:p>
           <a:p>
             <a:pPr lvl="1" eaLnBrk="1" latinLnBrk="0" hangingPunct="1"/>
             <a:r>
-              <a:rPr lang="es-ES_tradnl" smtClean="0"/>
+              <a:rPr lang="es-ES_tradnl"/>
               <a:t>Segundo nivel</a:t>
             </a:r>
           </a:p>
           <a:p>
             <a:pPr lvl="2" eaLnBrk="1" latinLnBrk="0" hangingPunct="1"/>
             <a:r>
-              <a:rPr lang="es-ES_tradnl" smtClean="0"/>
+              <a:rPr lang="es-ES_tradnl"/>
               <a:t>Tercer nivel</a:t>
             </a:r>
           </a:p>
           <a:p>
             <a:pPr lvl="3" eaLnBrk="1" latinLnBrk="0" hangingPunct="1"/>
             <a:r>
-              <a:rPr lang="es-ES_tradnl" smtClean="0"/>
+              <a:rPr lang="es-ES_tradnl"/>
               <a:t>Cuarto nivel</a:t>
             </a:r>
           </a:p>
           <a:p>
             <a:pPr lvl="4" eaLnBrk="1" latinLnBrk="0" hangingPunct="1"/>
             <a:r>
-              <a:rPr lang="es-ES_tradnl" smtClean="0"/>
+              <a:rPr lang="es-ES_tradnl"/>
               <a:t>Quinto nivel</a:t>
             </a:r>
             <a:endParaRPr kumimoji="0" lang="en-US"/>
@@ -6922,7 +6872,7 @@
           <a:lstStyle/>
           <a:p>
             <a:r>
-              <a:rPr lang="es-ES_tradnl" smtClean="0"/>
+              <a:rPr lang="es-ES_tradnl"/>
               <a:t>2017-2018</a:t>
             </a:r>
             <a:endParaRPr lang="en-US"/>
@@ -6950,7 +6900,7 @@
           <a:lstStyle/>
           <a:p>
             <a:r>
-              <a:rPr lang="en-US" smtClean="0"/>
+              <a:rPr lang="en-US"/>
               <a:t>Introduction to Software Engineering</a:t>
             </a:r>
             <a:endParaRPr lang="en-US" dirty="0"/>
@@ -7442,7 +7392,7 @@
           </a:lstStyle>
           <a:p>
             <a:r>
-              <a:rPr kumimoji="0" lang="es-ES_tradnl" smtClean="0"/>
+              <a:rPr kumimoji="0" lang="es-ES_tradnl"/>
               <a:t>Clic para editar título</a:t>
             </a:r>
             <a:endParaRPr kumimoji="0" lang="en-US"/>
@@ -7475,7 +7425,7 @@
           </a:lstStyle>
           <a:p>
             <a:r>
-              <a:rPr kumimoji="0" lang="es-ES_tradnl" smtClean="0"/>
+              <a:rPr kumimoji="0" lang="es-ES_tradnl"/>
               <a:t>Arrastre la imagen al marcador de posición o haga clic en el icono para agregar</a:t>
             </a:r>
             <a:endParaRPr kumimoji="0" lang="en-US" dirty="0"/>
@@ -7529,7 +7479,7 @@
           <a:p>
             <a:pPr lvl="0" eaLnBrk="1" latinLnBrk="0" hangingPunct="1"/>
             <a:r>
-              <a:rPr kumimoji="0" lang="es-ES_tradnl" smtClean="0"/>
+              <a:rPr kumimoji="0" lang="es-ES_tradnl"/>
               <a:t>Haga clic para modificar el estilo de texto del patrón</a:t>
             </a:r>
           </a:p>
@@ -7592,7 +7542,7 @@
           <a:lstStyle/>
           <a:p>
             <a:r>
-              <a:rPr lang="es-ES_tradnl" smtClean="0"/>
+              <a:rPr lang="es-ES_tradnl"/>
               <a:t>2017-2018</a:t>
             </a:r>
             <a:endParaRPr lang="en-US"/>
@@ -7620,10 +7570,9 @@
           <a:lstStyle/>
           <a:p>
             <a:r>
-              <a:rPr lang="en-US" smtClean="0"/>
+              <a:rPr lang="en-US"/>
               <a:t>Introduction to Software Engineering</a:t>
             </a:r>
-            <a:endParaRPr lang="en-US"/>
           </a:p>
         </p:txBody>
       </p:sp>
@@ -7870,7 +7819,7 @@
           </a:lstStyle>
           <a:p>
             <a:r>
-              <a:rPr lang="es-ES_tradnl" smtClean="0"/>
+              <a:rPr lang="es-ES_tradnl"/>
               <a:t>2017-2018</a:t>
             </a:r>
             <a:endParaRPr lang="en-US" dirty="0"/>
@@ -7909,7 +7858,7 @@
           </a:lstStyle>
           <a:p>
             <a:r>
-              <a:rPr lang="en-US" smtClean="0"/>
+              <a:rPr lang="en-US"/>
               <a:t>Introduction to Software Engineering</a:t>
             </a:r>
             <a:endParaRPr lang="en-US" dirty="0"/>
@@ -8158,7 +8107,7 @@
           <a:lstStyle/>
           <a:p>
             <a:r>
-              <a:rPr kumimoji="0" lang="es-ES_tradnl" smtClean="0"/>
+              <a:rPr kumimoji="0" lang="es-ES_tradnl"/>
               <a:t>Clic para editar título</a:t>
             </a:r>
             <a:endParaRPr kumimoji="0" lang="en-US"/>
@@ -8192,35 +8141,35 @@
           <a:p>
             <a:pPr lvl="0" eaLnBrk="1" latinLnBrk="0" hangingPunct="1"/>
             <a:r>
-              <a:rPr kumimoji="0" lang="es-ES_tradnl" smtClean="0"/>
+              <a:rPr kumimoji="0" lang="es-ES_tradnl"/>
               <a:t>Haga clic para modificar el estilo de texto del patrón</a:t>
             </a:r>
           </a:p>
           <a:p>
             <a:pPr lvl="1" eaLnBrk="1" latinLnBrk="0" hangingPunct="1"/>
             <a:r>
-              <a:rPr kumimoji="0" lang="es-ES_tradnl" smtClean="0"/>
+              <a:rPr kumimoji="0" lang="es-ES_tradnl"/>
               <a:t>Segundo nivel</a:t>
             </a:r>
           </a:p>
           <a:p>
             <a:pPr lvl="2" eaLnBrk="1" latinLnBrk="0" hangingPunct="1"/>
             <a:r>
-              <a:rPr kumimoji="0" lang="es-ES_tradnl" smtClean="0"/>
+              <a:rPr kumimoji="0" lang="es-ES_tradnl"/>
               <a:t>Tercer nivel</a:t>
             </a:r>
           </a:p>
           <a:p>
             <a:pPr lvl="3" eaLnBrk="1" latinLnBrk="0" hangingPunct="1"/>
             <a:r>
-              <a:rPr kumimoji="0" lang="es-ES_tradnl" smtClean="0"/>
+              <a:rPr kumimoji="0" lang="es-ES_tradnl"/>
               <a:t>Cuarto nivel</a:t>
             </a:r>
           </a:p>
           <a:p>
             <a:pPr lvl="4" eaLnBrk="1" latinLnBrk="0" hangingPunct="1"/>
             <a:r>
-              <a:rPr kumimoji="0" lang="es-ES_tradnl" smtClean="0"/>
+              <a:rPr kumimoji="0" lang="es-ES_tradnl"/>
               <a:t>Quinto nivel</a:t>
             </a:r>
             <a:endParaRPr kumimoji="0" lang="en-US"/>
@@ -8567,26 +8516,22 @@
           <a:lstStyle/>
           <a:p>
             <a:r>
-              <a:rPr lang="en-US" noProof="0" dirty="0" err="1" smtClean="0"/>
+              <a:rPr lang="en-US" noProof="0" dirty="0" err="1"/>
               <a:t>Presentación</a:t>
             </a:r>
             <a:r>
-              <a:rPr lang="en-US" noProof="0" dirty="0" smtClean="0"/>
+              <a:rPr lang="en-US" noProof="0" dirty="0"/>
               <a:t> de </a:t>
             </a:r>
             <a:r>
-              <a:rPr lang="en-US" noProof="0" dirty="0" err="1" smtClean="0"/>
+              <a:rPr lang="en-US" noProof="0" dirty="0" err="1"/>
               <a:t>proyecto</a:t>
             </a:r>
-            <a:r>
-              <a:rPr lang="en-US" noProof="0" dirty="0" smtClean="0"/>
-              <a:t/>
-            </a:r>
             <a:br>
-              <a:rPr lang="en-US" noProof="0" dirty="0" smtClean="0"/>
+              <a:rPr lang="en-US" noProof="0" dirty="0"/>
             </a:br>
             <a:r>
-              <a:rPr lang="en-US" dirty="0" err="1" smtClean="0"/>
+              <a:rPr lang="en-US" dirty="0" err="1"/>
               <a:t>Intellidiet</a:t>
             </a:r>
             <a:endParaRPr lang="en-US" noProof="0" dirty="0"/>
@@ -8616,7 +8561,7 @@
           <a:lstStyle/>
           <a:p>
             <a:r>
-              <a:rPr lang="es-ES" dirty="0" smtClean="0"/>
+              <a:rPr lang="es-ES" dirty="0"/>
               <a:t>Equipo:</a:t>
             </a:r>
           </a:p>
@@ -8626,10 +8571,9 @@
               <a:buChar char="-"/>
             </a:pPr>
             <a:r>
-              <a:rPr lang="es-ES" dirty="0" smtClean="0"/>
+              <a:rPr lang="es-ES" dirty="0"/>
               <a:t>Alejandro Ramírez Escalona, Documentación</a:t>
             </a:r>
-            <a:endParaRPr lang="es-ES" dirty="0" smtClean="0"/>
           </a:p>
           <a:p>
             <a:pPr marL="285750" indent="-285750">
@@ -8637,15 +8581,15 @@
               <a:buChar char="-"/>
             </a:pPr>
             <a:r>
-              <a:rPr lang="es-ES" dirty="0" smtClean="0"/>
+              <a:rPr lang="es-ES" dirty="0"/>
               <a:t>Antonio Jesús Sánchez </a:t>
             </a:r>
             <a:r>
-              <a:rPr lang="es-ES" dirty="0" err="1" smtClean="0"/>
+              <a:rPr lang="es-ES" dirty="0" err="1"/>
               <a:t>Cerván</a:t>
             </a:r>
             <a:r>
-              <a:rPr lang="es-ES" dirty="0" smtClean="0"/>
+              <a:rPr lang="es-ES" dirty="0"/>
               <a:t>, Programador y Encargado de pruebas</a:t>
             </a:r>
           </a:p>
@@ -8655,7 +8599,7 @@
               <a:buChar char="-"/>
             </a:pPr>
             <a:r>
-              <a:rPr lang="es-ES" dirty="0" smtClean="0"/>
+              <a:rPr lang="es-ES" dirty="0"/>
               <a:t>Diego Arroyo Torres, Programador y Encargado de pruebas</a:t>
             </a:r>
           </a:p>
@@ -8665,7 +8609,7 @@
               <a:buChar char="-"/>
             </a:pPr>
             <a:r>
-              <a:rPr lang="es-ES" dirty="0" smtClean="0"/>
+              <a:rPr lang="es-ES" dirty="0"/>
               <a:t>Darío Jesús Flores Sevilla, Programador y Encargado de pruebas</a:t>
             </a:r>
           </a:p>
@@ -8675,15 +8619,15 @@
               <a:buChar char="-"/>
             </a:pPr>
             <a:r>
-              <a:rPr lang="es-ES" dirty="0" smtClean="0"/>
+              <a:rPr lang="es-ES" dirty="0"/>
               <a:t>Manuel López </a:t>
             </a:r>
             <a:r>
-              <a:rPr lang="es-ES" dirty="0" err="1" smtClean="0"/>
+              <a:rPr lang="es-ES" dirty="0" err="1"/>
               <a:t>Reviriego</a:t>
             </a:r>
             <a:r>
-              <a:rPr lang="es-ES" dirty="0" smtClean="0"/>
+              <a:rPr lang="es-ES" dirty="0"/>
               <a:t>, Programador, Encargado de pruebas y Jefe de Proyecto</a:t>
             </a:r>
           </a:p>
@@ -8693,27 +8637,27 @@
               <a:buChar char="-"/>
             </a:pPr>
             <a:r>
-              <a:rPr lang="es-ES" dirty="0" err="1" smtClean="0"/>
+              <a:rPr lang="es-ES" dirty="0" err="1"/>
               <a:t>Meead</a:t>
             </a:r>
             <a:r>
-              <a:rPr lang="es-ES" dirty="0" smtClean="0"/>
+              <a:rPr lang="es-ES" dirty="0"/>
               <a:t> </a:t>
             </a:r>
             <a:r>
-              <a:rPr lang="es-ES" dirty="0" err="1" smtClean="0"/>
+              <a:rPr lang="es-ES" dirty="0" err="1"/>
               <a:t>Meyfour</a:t>
             </a:r>
             <a:r>
-              <a:rPr lang="es-ES" dirty="0" smtClean="0"/>
+              <a:rPr lang="es-ES" dirty="0"/>
               <a:t> </a:t>
             </a:r>
             <a:r>
-              <a:rPr lang="es-ES" dirty="0" err="1" smtClean="0"/>
+              <a:rPr lang="es-ES" dirty="0" err="1"/>
               <a:t>Asadi</a:t>
             </a:r>
             <a:r>
-              <a:rPr lang="es-ES" dirty="0" smtClean="0"/>
+              <a:rPr lang="es-ES" dirty="0"/>
               <a:t>, Programador y Encargado de pruebas</a:t>
             </a:r>
           </a:p>
@@ -8723,7 +8667,7 @@
               <a:buChar char="-"/>
             </a:pPr>
             <a:r>
-              <a:rPr lang="es-ES" dirty="0" smtClean="0"/>
+              <a:rPr lang="es-ES" dirty="0"/>
               <a:t>Miguel Mejía Jiménez, Modelado, Documentación y Jefe de Proyecto</a:t>
             </a:r>
           </a:p>
@@ -8733,12 +8677,8 @@
               <a:buChar char="-"/>
             </a:pPr>
             <a:r>
-              <a:rPr lang="es-ES" dirty="0" smtClean="0"/>
-              <a:t>Néstor Fer</a:t>
-            </a:r>
-            <a:r>
-              <a:rPr lang="es-ES" dirty="0" smtClean="0"/>
-              <a:t>nández González, Programador y Encargado de pruebas</a:t>
+              <a:rPr lang="es-ES" dirty="0"/>
+              <a:t>Néstor Fernández González, Programador y Encargado de pruebas</a:t>
             </a:r>
           </a:p>
           <a:p>
@@ -8747,16 +8687,15 @@
               <a:buChar char="-"/>
             </a:pPr>
             <a:r>
-              <a:rPr lang="es-ES" dirty="0" smtClean="0"/>
+              <a:rPr lang="es-ES" dirty="0"/>
               <a:t>Rafael Merinas Lapuente, Programador y </a:t>
             </a:r>
           </a:p>
           <a:p>
             <a:r>
-              <a:rPr lang="es-ES" dirty="0" smtClean="0"/>
+              <a:rPr lang="es-ES" dirty="0"/>
               <a:t>     Encargado de pruebas</a:t>
             </a:r>
-            <a:endParaRPr lang="es-ES" dirty="0" smtClean="0"/>
           </a:p>
           <a:p>
             <a:endParaRPr lang="es-ES" dirty="0"/>
@@ -8774,13 +8713,6 @@
     <a:masterClrMapping/>
   </p:clrMapOvr>
   <p:transition/>
-  <p:timing>
-    <p:tnLst>
-      <p:par>
-        <p:cTn id="1" dur="indefinite" restart="never" nodeType="tmRoot"/>
-      </p:par>
-    </p:tnLst>
-  </p:timing>
 </p:sld>
 </file>
 
@@ -8816,6 +8748,18 @@
           <a:bodyPr/>
           <a:lstStyle/>
           <a:p>
+            <a:r>
+              <a:rPr lang="es-ES" dirty="0"/>
+              <a:t>Actividades de Ing. </a:t>
+            </a:r>
+            <a:r>
+              <a:rPr lang="es-ES" dirty="0" err="1"/>
+              <a:t>Sw</a:t>
+            </a:r>
+            <a:r>
+              <a:rPr lang="es-ES" dirty="0"/>
+              <a:t> - Principios</a:t>
+            </a:r>
             <a:endParaRPr lang="en-US" noProof="0" dirty="0"/>
           </a:p>
         </p:txBody>
@@ -8836,7 +8780,7 @@
           <a:lstStyle/>
           <a:p>
             <a:r>
-              <a:rPr lang="es-ES_tradnl" smtClean="0"/>
+              <a:rPr lang="es-ES_tradnl"/>
               <a:t>2017-2018</a:t>
             </a:r>
             <a:endParaRPr lang="en-US" dirty="0"/>
@@ -8857,6 +8801,22 @@
         <p:txBody>
           <a:bodyPr/>
           <a:lstStyle/>
+          <a:p>
+            <a:r>
+              <a:rPr lang="es-ES" dirty="0"/>
+              <a:t>Hacemos uso del Principio Abierto-Cerrado, el proyecto está abierto para expansión.</a:t>
+            </a:r>
+          </a:p>
+          <a:p>
+            <a:r>
+              <a:rPr lang="es-ES" dirty="0"/>
+              <a:t>Posibles nuevas funcionalidades: Más parámetros para calcular la dieta, mostrar un precio aproximado al dar </a:t>
+            </a:r>
+            <a:r>
+              <a:rPr lang="es-ES"/>
+              <a:t>la dieta</a:t>
+            </a:r>
+          </a:p>
           <a:p>
             <a:endParaRPr lang="es-ES" dirty="0"/>
           </a:p>
@@ -8865,7 +8825,7 @@
     </p:spTree>
     <p:extLst>
       <p:ext uri="{BB962C8B-B14F-4D97-AF65-F5344CB8AC3E}">
-        <p14:creationId xmlns:p14="http://schemas.microsoft.com/office/powerpoint/2010/main" val="1895953281"/>
+        <p14:creationId xmlns:p14="http://schemas.microsoft.com/office/powerpoint/2010/main" val="883702286"/>
       </p:ext>
     </p:extLst>
   </p:cSld>
@@ -8873,13 +8833,6 @@
     <a:masterClrMapping/>
   </p:clrMapOvr>
   <p:transition advClick="0" advTm="20000"/>
-  <p:timing>
-    <p:tnLst>
-      <p:par>
-        <p:cTn id="1" dur="indefinite" restart="never" nodeType="tmRoot"/>
-      </p:par>
-    </p:tnLst>
-  </p:timing>
 </p:sld>
 </file>
 
@@ -8912,9 +8865,23 @@
         </p:nvSpPr>
         <p:spPr/>
         <p:txBody>
-          <a:bodyPr/>
-          <a:lstStyle/>
-          <a:p>
+          <a:bodyPr>
+            <a:normAutofit/>
+          </a:bodyPr>
+          <a:lstStyle/>
+          <a:p>
+            <a:r>
+              <a:rPr lang="es-ES" dirty="0"/>
+              <a:t>Actividades de Ing. </a:t>
+            </a:r>
+            <a:r>
+              <a:rPr lang="es-ES" dirty="0" err="1"/>
+              <a:t>Sw</a:t>
+            </a:r>
+            <a:r>
+              <a:rPr lang="es-ES" dirty="0"/>
+              <a:t> - Pruebas</a:t>
+            </a:r>
             <a:endParaRPr lang="en-US" noProof="0" dirty="0"/>
           </a:p>
         </p:txBody>
@@ -8935,7 +8902,7 @@
           <a:lstStyle/>
           <a:p>
             <a:r>
-              <a:rPr lang="es-ES_tradnl" smtClean="0"/>
+              <a:rPr lang="es-ES_tradnl"/>
               <a:t>2017-2018</a:t>
             </a:r>
             <a:endParaRPr lang="en-US" dirty="0"/>
@@ -8972,13 +8939,6 @@
     <a:masterClrMapping/>
   </p:clrMapOvr>
   <p:transition advClick="0" advTm="20000"/>
-  <p:timing>
-    <p:tnLst>
-      <p:par>
-        <p:cTn id="1" dur="indefinite" restart="never" nodeType="tmRoot"/>
-      </p:par>
-    </p:tnLst>
-  </p:timing>
 </p:sld>
 </file>
 
@@ -9014,6 +8974,10 @@
           <a:bodyPr/>
           <a:lstStyle/>
           <a:p>
+            <a:r>
+              <a:rPr lang="es-ES" dirty="0"/>
+              <a:t>Desarrollo/Despliegue - Estrategias</a:t>
+            </a:r>
             <a:endParaRPr lang="en-US" noProof="0" dirty="0"/>
           </a:p>
         </p:txBody>
@@ -9034,7 +8998,7 @@
           <a:lstStyle/>
           <a:p>
             <a:r>
-              <a:rPr lang="es-ES_tradnl" smtClean="0"/>
+              <a:rPr lang="es-ES_tradnl"/>
               <a:t>2017-2018</a:t>
             </a:r>
             <a:endParaRPr lang="en-US" dirty="0"/>
@@ -9071,13 +9035,6 @@
     <a:masterClrMapping/>
   </p:clrMapOvr>
   <p:transition advClick="0" advTm="20000"/>
-  <p:timing>
-    <p:tnLst>
-      <p:par>
-        <p:cTn id="1" dur="indefinite" restart="never" nodeType="tmRoot"/>
-      </p:par>
-    </p:tnLst>
-  </p:timing>
 </p:sld>
 </file>
 
@@ -9110,9 +9067,15 @@
         </p:nvSpPr>
         <p:spPr/>
         <p:txBody>
-          <a:bodyPr/>
-          <a:lstStyle/>
-          <a:p>
+          <a:bodyPr>
+            <a:normAutofit/>
+          </a:bodyPr>
+          <a:lstStyle/>
+          <a:p>
+            <a:r>
+              <a:rPr lang="es-ES" dirty="0"/>
+              <a:t>Desarrollo/Despliegue - Herramientas</a:t>
+            </a:r>
             <a:endParaRPr lang="en-US" noProof="0" dirty="0"/>
           </a:p>
         </p:txBody>
@@ -9133,7 +9096,7 @@
           <a:lstStyle/>
           <a:p>
             <a:r>
-              <a:rPr lang="es-ES_tradnl" smtClean="0"/>
+              <a:rPr lang="es-ES_tradnl"/>
               <a:t>2017-2018</a:t>
             </a:r>
             <a:endParaRPr lang="en-US" dirty="0"/>
@@ -9170,13 +9133,6 @@
     <a:masterClrMapping/>
   </p:clrMapOvr>
   <p:transition advClick="0" advTm="20000"/>
-  <p:timing>
-    <p:tnLst>
-      <p:par>
-        <p:cTn id="1" dur="indefinite" restart="never" nodeType="tmRoot"/>
-      </p:par>
-    </p:tnLst>
-  </p:timing>
 </p:sld>
 </file>
 
@@ -9209,9 +9165,15 @@
         </p:nvSpPr>
         <p:spPr/>
         <p:txBody>
-          <a:bodyPr/>
-          <a:lstStyle/>
-          <a:p>
+          <a:bodyPr>
+            <a:normAutofit/>
+          </a:bodyPr>
+          <a:lstStyle/>
+          <a:p>
+            <a:r>
+              <a:rPr lang="es-ES" dirty="0"/>
+              <a:t>Desarrollo– Implementación – Qué es real</a:t>
+            </a:r>
             <a:endParaRPr lang="en-US" noProof="0" dirty="0"/>
           </a:p>
         </p:txBody>
@@ -9232,7 +9194,7 @@
           <a:lstStyle/>
           <a:p>
             <a:r>
-              <a:rPr lang="es-ES_tradnl" smtClean="0"/>
+              <a:rPr lang="es-ES_tradnl"/>
               <a:t>2017-2018</a:t>
             </a:r>
             <a:endParaRPr lang="en-US" dirty="0"/>
@@ -9254,6 +9216,21 @@
           <a:bodyPr/>
           <a:lstStyle/>
           <a:p>
+            <a:r>
+              <a:rPr lang="es-ES" dirty="0"/>
+              <a:t>Proyecto Java que tiene una IA para producir dietas</a:t>
+            </a:r>
+          </a:p>
+          <a:p>
+            <a:r>
+              <a:rPr lang="es-ES" dirty="0"/>
+              <a:t>Base de datos con los datos necesarios para el proyecto</a:t>
+            </a:r>
+          </a:p>
+          <a:p>
+            <a:pPr marL="0" indent="0">
+              <a:buNone/>
+            </a:pPr>
             <a:endParaRPr lang="es-ES" dirty="0"/>
           </a:p>
         </p:txBody>
@@ -9269,13 +9246,6 @@
     <a:masterClrMapping/>
   </p:clrMapOvr>
   <p:transition advClick="0" advTm="20000"/>
-  <p:timing>
-    <p:tnLst>
-      <p:par>
-        <p:cTn id="1" dur="indefinite" restart="never" nodeType="tmRoot"/>
-      </p:par>
-    </p:tnLst>
-  </p:timing>
 </p:sld>
 </file>
 
@@ -9308,9 +9278,15 @@
         </p:nvSpPr>
         <p:spPr/>
         <p:txBody>
-          <a:bodyPr/>
-          <a:lstStyle/>
-          <a:p>
+          <a:bodyPr>
+            <a:normAutofit fontScale="90000"/>
+          </a:bodyPr>
+          <a:lstStyle/>
+          <a:p>
+            <a:r>
+              <a:rPr lang="es-ES" dirty="0"/>
+              <a:t>Desarrollo– Implementación – Qué no es real</a:t>
+            </a:r>
             <a:endParaRPr lang="en-US" noProof="0" dirty="0"/>
           </a:p>
         </p:txBody>
@@ -9331,7 +9307,7 @@
           <a:lstStyle/>
           <a:p>
             <a:r>
-              <a:rPr lang="es-ES_tradnl" smtClean="0"/>
+              <a:rPr lang="es-ES_tradnl"/>
               <a:t>2017-2018</a:t>
             </a:r>
             <a:endParaRPr lang="en-US" dirty="0"/>
@@ -9368,13 +9344,6 @@
     <a:masterClrMapping/>
   </p:clrMapOvr>
   <p:transition advClick="0" advTm="20000"/>
-  <p:timing>
-    <p:tnLst>
-      <p:par>
-        <p:cTn id="1" dur="indefinite" restart="never" nodeType="tmRoot"/>
-      </p:par>
-    </p:tnLst>
-  </p:timing>
 </p:sld>
 </file>
 
@@ -9410,6 +9379,10 @@
           <a:bodyPr/>
           <a:lstStyle/>
           <a:p>
+            <a:r>
+              <a:rPr lang="en-US" noProof="0" dirty="0" err="1"/>
+              <a:t>Despliegue</a:t>
+            </a:r>
             <a:endParaRPr lang="en-US" noProof="0" dirty="0"/>
           </a:p>
         </p:txBody>
@@ -9430,7 +9403,7 @@
           <a:lstStyle/>
           <a:p>
             <a:r>
-              <a:rPr lang="es-ES_tradnl" smtClean="0"/>
+              <a:rPr lang="es-ES_tradnl"/>
               <a:t>2017-2018</a:t>
             </a:r>
             <a:endParaRPr lang="en-US" dirty="0"/>
@@ -9467,13 +9440,6 @@
     <a:masterClrMapping/>
   </p:clrMapOvr>
   <p:transition advClick="0" advTm="20000"/>
-  <p:timing>
-    <p:tnLst>
-      <p:par>
-        <p:cTn id="1" dur="indefinite" restart="never" nodeType="tmRoot"/>
-      </p:par>
-    </p:tnLst>
-  </p:timing>
 </p:sld>
 </file>
 
@@ -9509,6 +9475,10 @@
           <a:bodyPr/>
           <a:lstStyle/>
           <a:p>
+            <a:r>
+              <a:rPr lang="en-US" noProof="0" dirty="0" err="1"/>
+              <a:t>Resultados</a:t>
+            </a:r>
             <a:endParaRPr lang="en-US" noProof="0" dirty="0"/>
           </a:p>
         </p:txBody>
@@ -9529,7 +9499,7 @@
           <a:lstStyle/>
           <a:p>
             <a:r>
-              <a:rPr lang="es-ES_tradnl" smtClean="0"/>
+              <a:rPr lang="es-ES_tradnl"/>
               <a:t>2017-2018</a:t>
             </a:r>
             <a:endParaRPr lang="en-US" dirty="0"/>
@@ -9566,13 +9536,6 @@
     <a:masterClrMapping/>
   </p:clrMapOvr>
   <p:transition advClick="0" advTm="20000"/>
-  <p:timing>
-    <p:tnLst>
-      <p:par>
-        <p:cTn id="1" dur="indefinite" restart="never" nodeType="tmRoot"/>
-      </p:par>
-    </p:tnLst>
-  </p:timing>
 </p:sld>
 </file>
 
@@ -9608,6 +9571,10 @@
           <a:bodyPr/>
           <a:lstStyle/>
           <a:p>
+            <a:r>
+              <a:rPr lang="en-US" noProof="0" dirty="0" err="1"/>
+              <a:t>Conclusiones</a:t>
+            </a:r>
             <a:endParaRPr lang="en-US" noProof="0" dirty="0"/>
           </a:p>
         </p:txBody>
@@ -9628,7 +9595,7 @@
           <a:lstStyle/>
           <a:p>
             <a:r>
-              <a:rPr lang="es-ES_tradnl" smtClean="0"/>
+              <a:rPr lang="es-ES_tradnl"/>
               <a:t>2017-2018</a:t>
             </a:r>
             <a:endParaRPr lang="en-US" dirty="0"/>
@@ -9665,13 +9632,6 @@
     <a:masterClrMapping/>
   </p:clrMapOvr>
   <p:transition advClick="0" advTm="20000"/>
-  <p:timing>
-    <p:tnLst>
-      <p:par>
-        <p:cTn id="1" dur="indefinite" restart="never" nodeType="tmRoot"/>
-      </p:par>
-    </p:tnLst>
-  </p:timing>
 </p:sld>
 </file>
 
@@ -9727,7 +9687,7 @@
           <a:lstStyle/>
           <a:p>
             <a:r>
-              <a:rPr lang="es-ES_tradnl" smtClean="0"/>
+              <a:rPr lang="es-ES_tradnl"/>
               <a:t>2017-2018</a:t>
             </a:r>
             <a:endParaRPr lang="en-US" dirty="0"/>
@@ -9764,13 +9724,6 @@
     <a:masterClrMapping/>
   </p:clrMapOvr>
   <p:transition advClick="0" advTm="20000"/>
-  <p:timing>
-    <p:tnLst>
-      <p:par>
-        <p:cTn id="1" dur="indefinite" restart="never" nodeType="tmRoot"/>
-      </p:par>
-    </p:tnLst>
-  </p:timing>
 </p:sld>
 </file>
 
@@ -9807,7 +9760,7 @@
           <a:lstStyle/>
           <a:p>
             <a:r>
-              <a:rPr lang="en-US" noProof="0" dirty="0" err="1" smtClean="0"/>
+              <a:rPr lang="en-US" noProof="0" dirty="0" err="1"/>
               <a:t>Contenidos</a:t>
             </a:r>
             <a:endParaRPr lang="en-US" noProof="0" dirty="0"/>
@@ -9830,7 +9783,7 @@
           <a:lstStyle/>
           <a:p>
             <a:r>
-              <a:rPr lang="es-ES_tradnl" smtClean="0"/>
+              <a:rPr lang="es-ES_tradnl"/>
               <a:t>2017-2018</a:t>
             </a:r>
             <a:endParaRPr lang="en-US" dirty="0"/>
@@ -9855,114 +9808,112 @@
           <a:lstStyle/>
           <a:p>
             <a:r>
-              <a:rPr lang="es-ES" dirty="0" smtClean="0"/>
+              <a:rPr lang="es-ES" dirty="0"/>
               <a:t>Introducción </a:t>
             </a:r>
             <a:r>
-              <a:rPr lang="mr-IN" dirty="0" smtClean="0"/>
+              <a:rPr lang="mr-IN" dirty="0"/>
               <a:t>–</a:t>
             </a:r>
             <a:r>
-              <a:rPr lang="es-ES" dirty="0" smtClean="0"/>
+              <a:rPr lang="es-ES" dirty="0"/>
               <a:t> El problema</a:t>
             </a:r>
           </a:p>
           <a:p>
             <a:r>
-              <a:rPr lang="es-ES" dirty="0" smtClean="0"/>
+              <a:rPr lang="es-ES" dirty="0"/>
               <a:t>El equipo y el trabajo en equipo</a:t>
             </a:r>
           </a:p>
           <a:p>
             <a:r>
-              <a:rPr lang="es-ES" dirty="0" smtClean="0"/>
+              <a:rPr lang="es-ES" dirty="0"/>
               <a:t>La solución</a:t>
             </a:r>
           </a:p>
           <a:p>
             <a:r>
-              <a:rPr lang="es-ES" dirty="0" smtClean="0"/>
+              <a:rPr lang="es-ES" dirty="0"/>
               <a:t>Actividades de Ing. </a:t>
             </a:r>
             <a:r>
-              <a:rPr lang="es-ES" dirty="0" err="1" smtClean="0"/>
+              <a:rPr lang="es-ES" dirty="0" err="1"/>
               <a:t>Sw</a:t>
             </a:r>
-            <a:endParaRPr lang="es-ES" dirty="0" smtClean="0"/>
+            <a:endParaRPr lang="es-ES" dirty="0"/>
           </a:p>
           <a:p>
             <a:pPr lvl="1"/>
             <a:r>
-              <a:rPr lang="es-ES" dirty="0" smtClean="0"/>
+              <a:rPr lang="es-ES" dirty="0"/>
               <a:t>Requisitos</a:t>
             </a:r>
           </a:p>
           <a:p>
             <a:pPr lvl="1"/>
             <a:r>
-              <a:rPr lang="es-ES" dirty="0" smtClean="0"/>
+              <a:rPr lang="es-ES" dirty="0"/>
               <a:t>Arquitectura</a:t>
             </a:r>
           </a:p>
           <a:p>
             <a:pPr lvl="1"/>
             <a:r>
-              <a:rPr lang="es-ES" dirty="0" smtClean="0"/>
+              <a:rPr lang="es-ES" dirty="0"/>
               <a:t>Modelos </a:t>
             </a:r>
           </a:p>
           <a:p>
             <a:pPr lvl="1"/>
             <a:r>
-              <a:rPr lang="es-ES" dirty="0" smtClean="0"/>
+              <a:rPr lang="es-ES" dirty="0"/>
               <a:t>Patrones/Principios </a:t>
             </a:r>
           </a:p>
           <a:p>
             <a:pPr lvl="1"/>
             <a:r>
-              <a:rPr lang="es-ES" dirty="0" smtClean="0"/>
+              <a:rPr lang="es-ES" dirty="0"/>
               <a:t>Pruebas</a:t>
             </a:r>
-            <a:endParaRPr lang="es-ES" dirty="0" smtClean="0"/>
-          </a:p>
-          <a:p>
-            <a:r>
-              <a:rPr lang="es-ES" dirty="0" smtClean="0"/>
+          </a:p>
+          <a:p>
+            <a:r>
+              <a:rPr lang="es-ES" dirty="0"/>
               <a:t>Desarrollo/Despliegue</a:t>
             </a:r>
           </a:p>
           <a:p>
             <a:pPr lvl="1"/>
             <a:r>
-              <a:rPr lang="es-ES" dirty="0" smtClean="0"/>
+              <a:rPr lang="es-ES" dirty="0"/>
               <a:t>Estrategias y herramientas</a:t>
             </a:r>
           </a:p>
           <a:p>
             <a:pPr lvl="1"/>
             <a:r>
-              <a:rPr lang="es-ES" dirty="0" smtClean="0"/>
+              <a:rPr lang="es-ES" dirty="0"/>
               <a:t>Modelo de Implementación (qué es y qué no es real)</a:t>
             </a:r>
           </a:p>
           <a:p>
             <a:pPr lvl="1"/>
             <a:r>
-              <a:rPr lang="es-ES" dirty="0" smtClean="0"/>
+              <a:rPr lang="es-ES" dirty="0"/>
               <a:t>Despliegue</a:t>
             </a:r>
-            <a:endParaRPr lang="es-ES" dirty="0"/>
-          </a:p>
-          <a:p>
-            <a:r>
-              <a:rPr lang="es-ES" dirty="0" smtClean="0"/>
+          </a:p>
+          <a:p>
+            <a:r>
+              <a:rPr lang="es-ES" dirty="0"/>
               <a:t>Resultados</a:t>
             </a:r>
           </a:p>
           <a:p>
             <a:r>
-              <a:rPr lang="es-ES" dirty="0" smtClean="0"/>
+              <a:rPr lang="es-ES" dirty="0"/>
               <a:t>Conclusiones</a:t>
             </a:r>
           </a:p>
@@ -9979,13 +9930,6 @@
     <a:masterClrMapping/>
   </p:clrMapOvr>
   <p:transition advClick="0" advTm="20000"/>
-  <p:timing>
-    <p:tnLst>
-      <p:par>
-        <p:cTn id="1" dur="indefinite" restart="never" nodeType="tmRoot"/>
-      </p:par>
-    </p:tnLst>
-  </p:timing>
 </p:sld>
 </file>
 
@@ -10041,7 +9985,7 @@
           <a:lstStyle/>
           <a:p>
             <a:r>
-              <a:rPr lang="es-ES_tradnl" smtClean="0"/>
+              <a:rPr lang="es-ES_tradnl"/>
               <a:t>2017-2018</a:t>
             </a:r>
             <a:endParaRPr lang="en-US" dirty="0"/>
@@ -10078,13 +10022,6 @@
     <a:masterClrMapping/>
   </p:clrMapOvr>
   <p:transition advClick="0" advTm="20000"/>
-  <p:timing>
-    <p:tnLst>
-      <p:par>
-        <p:cTn id="1" dur="indefinite" restart="never" nodeType="tmRoot"/>
-      </p:par>
-    </p:tnLst>
-  </p:timing>
 </p:sld>
 </file>
 
@@ -10140,7 +10077,7 @@
           <a:lstStyle/>
           <a:p>
             <a:r>
-              <a:rPr lang="es-ES_tradnl" smtClean="0"/>
+              <a:rPr lang="es-ES_tradnl"/>
               <a:t>2017-2018</a:t>
             </a:r>
             <a:endParaRPr lang="en-US" dirty="0"/>
@@ -10177,13 +10114,6 @@
     <a:masterClrMapping/>
   </p:clrMapOvr>
   <p:transition advClick="0" advTm="20000"/>
-  <p:timing>
-    <p:tnLst>
-      <p:par>
-        <p:cTn id="1" dur="indefinite" restart="never" nodeType="tmRoot"/>
-      </p:par>
-    </p:tnLst>
-  </p:timing>
 </p:sld>
 </file>
 
@@ -10221,33 +10151,17 @@
           </a:bodyPr>
           <a:lstStyle/>
           <a:p>
-            <a:r>
-              <a:rPr lang="es-ES" dirty="0" smtClean="0"/>
-              <a:t/>
-            </a:r>
-            <a:br>
-              <a:rPr lang="es-ES" dirty="0" smtClean="0"/>
-            </a:br>
-            <a:r>
-              <a:rPr lang="es-ES" dirty="0" smtClean="0"/>
-              <a:t/>
-            </a:r>
-            <a:br>
-              <a:rPr lang="es-ES" dirty="0" smtClean="0"/>
-            </a:br>
-            <a:r>
-              <a:rPr lang="es-ES" dirty="0"/>
-              <a:t/>
-            </a:r>
             <a:br>
               <a:rPr lang="es-ES" dirty="0"/>
             </a:br>
-            <a:r>
-              <a:rPr lang="es-ES" dirty="0" smtClean="0"/>
-              <a:t/>
-            </a:r>
             <a:br>
-              <a:rPr lang="es-ES" dirty="0" smtClean="0"/>
+              <a:rPr lang="es-ES" dirty="0"/>
+            </a:br>
+            <a:br>
+              <a:rPr lang="es-ES" dirty="0"/>
+            </a:br>
+            <a:br>
+              <a:rPr lang="es-ES" dirty="0"/>
             </a:br>
             <a:r>
               <a:rPr lang="es-ES" dirty="0"/>
@@ -10259,11 +10173,7 @@
             </a:r>
             <a:r>
               <a:rPr lang="es-ES" dirty="0"/>
-              <a:t> El </a:t>
-            </a:r>
-            <a:r>
-              <a:rPr lang="es-ES" dirty="0" smtClean="0"/>
-              <a:t>problema</a:t>
+              <a:t> El problema</a:t>
             </a:r>
             <a:endParaRPr lang="en-US" noProof="0" dirty="0"/>
           </a:p>
@@ -10285,7 +10195,7 @@
           <a:lstStyle/>
           <a:p>
             <a:r>
-              <a:rPr lang="es-ES_tradnl" smtClean="0"/>
+              <a:rPr lang="es-ES_tradnl"/>
               <a:t>2017-2018</a:t>
             </a:r>
             <a:endParaRPr lang="en-US" dirty="0"/>
@@ -10308,22 +10218,21 @@
           <a:lstStyle/>
           <a:p>
             <a:r>
-              <a:rPr lang="es-ES" dirty="0" smtClean="0"/>
+              <a:rPr lang="es-ES" dirty="0"/>
               <a:t>Intentar mejorar la vida cotidiana mediante el uso de una IA</a:t>
             </a:r>
           </a:p>
           <a:p>
             <a:r>
-              <a:rPr lang="es-ES" dirty="0" smtClean="0"/>
+              <a:rPr lang="es-ES" dirty="0"/>
               <a:t>Encontrar problemas o dificultades del día a día</a:t>
             </a:r>
           </a:p>
           <a:p>
             <a:r>
-              <a:rPr lang="es-ES" dirty="0" smtClean="0"/>
+              <a:rPr lang="es-ES" dirty="0"/>
               <a:t>Decisión final: un asistente para dietas</a:t>
             </a:r>
-            <a:endParaRPr lang="es-ES" dirty="0"/>
           </a:p>
         </p:txBody>
       </p:sp>
@@ -10368,13 +10277,6 @@
     <a:masterClrMapping/>
   </p:clrMapOvr>
   <p:transition advClick="0" advTm="20000"/>
-  <p:timing>
-    <p:tnLst>
-      <p:par>
-        <p:cTn id="1" dur="indefinite" restart="never" nodeType="tmRoot"/>
-      </p:par>
-    </p:tnLst>
-  </p:timing>
 </p:sld>
 </file>
 
@@ -10442,7 +10344,7 @@
           <a:lstStyle/>
           <a:p>
             <a:r>
-              <a:rPr lang="es-ES_tradnl" smtClean="0"/>
+              <a:rPr lang="es-ES_tradnl"/>
               <a:t>2017-2018</a:t>
             </a:r>
             <a:endParaRPr lang="en-US" dirty="0"/>
@@ -10465,26 +10367,21 @@
           <a:lstStyle/>
           <a:p>
             <a:r>
-              <a:rPr lang="es-ES" dirty="0" smtClean="0"/>
+              <a:rPr lang="es-ES" dirty="0"/>
               <a:t>¿Es posible encontrar una dieta lo más correcta posible?</a:t>
             </a:r>
           </a:p>
           <a:p>
             <a:r>
-              <a:rPr lang="es-ES" dirty="0" smtClean="0"/>
+              <a:rPr lang="es-ES" dirty="0"/>
               <a:t>Buscar un algoritmo para calcular una dieta</a:t>
             </a:r>
           </a:p>
           <a:p>
             <a:r>
-              <a:rPr lang="es-ES" dirty="0" smtClean="0"/>
-              <a:t>Ser ca</a:t>
-            </a:r>
-            <a:r>
-              <a:rPr lang="es-ES" dirty="0" smtClean="0"/>
-              <a:t>paz de aprender de la retroalimentación del usuario</a:t>
-            </a:r>
-            <a:endParaRPr lang="es-ES" dirty="0"/>
+              <a:rPr lang="es-ES" dirty="0"/>
+              <a:t>Ser capaz de aprender de la retroalimentación del usuario</a:t>
+            </a:r>
           </a:p>
         </p:txBody>
       </p:sp>
@@ -10499,13 +10396,6 @@
     <a:masterClrMapping/>
   </p:clrMapOvr>
   <p:transition advClick="0" advTm="20000"/>
-  <p:timing>
-    <p:tnLst>
-      <p:par>
-        <p:cTn id="1" dur="indefinite" restart="never" nodeType="tmRoot"/>
-      </p:par>
-    </p:tnLst>
-  </p:timing>
 </p:sld>
 </file>
 
@@ -10543,24 +10433,12 @@
           </a:bodyPr>
           <a:lstStyle/>
           <a:p>
-            <a:r>
-              <a:rPr lang="es-ES" dirty="0" smtClean="0"/>
-              <a:t/>
-            </a:r>
             <a:br>
-              <a:rPr lang="es-ES" dirty="0" smtClean="0"/>
+              <a:rPr lang="es-ES" dirty="0"/>
             </a:br>
             <a:r>
-              <a:rPr lang="es-ES" dirty="0" smtClean="0"/>
-              <a:t>El </a:t>
-            </a:r>
-            <a:r>
               <a:rPr lang="es-ES" dirty="0"/>
-              <a:t>equipo y el trabajo en </a:t>
-            </a:r>
-            <a:r>
-              <a:rPr lang="es-ES" dirty="0" smtClean="0"/>
-              <a:t>equipo</a:t>
+              <a:t>El equipo y el trabajo en equipo</a:t>
             </a:r>
             <a:endParaRPr lang="en-US" noProof="0" dirty="0"/>
           </a:p>
@@ -10582,7 +10460,7 @@
           <a:lstStyle/>
           <a:p>
             <a:r>
-              <a:rPr lang="es-ES_tradnl" smtClean="0"/>
+              <a:rPr lang="es-ES_tradnl"/>
               <a:t>2017-2018</a:t>
             </a:r>
             <a:endParaRPr lang="en-US" dirty="0"/>
@@ -10604,7 +10482,43 @@
           <a:bodyPr/>
           <a:lstStyle/>
           <a:p>
+            <a:r>
+              <a:rPr lang="es-ES" dirty="0"/>
+              <a:t>División en grupos: Documentación, implementación Java, implementación </a:t>
+            </a:r>
+            <a:r>
+              <a:rPr lang="es-ES" dirty="0" err="1"/>
+              <a:t>html</a:t>
+            </a:r>
+            <a:r>
+              <a:rPr lang="es-ES" dirty="0"/>
+              <a:t> y </a:t>
+            </a:r>
+            <a:r>
+              <a:rPr lang="es-ES" dirty="0" err="1"/>
+              <a:t>php</a:t>
+            </a:r>
+            <a:r>
+              <a:rPr lang="es-ES" dirty="0"/>
+              <a:t> </a:t>
+            </a:r>
+            <a:r>
+              <a:rPr lang="es-ES" dirty="0" err="1"/>
+              <a:t>étc</a:t>
+            </a:r>
             <a:endParaRPr lang="es-ES" dirty="0"/>
+          </a:p>
+          <a:p>
+            <a:r>
+              <a:rPr lang="es-ES" dirty="0"/>
+              <a:t>Reuniones para ponernos de acuerdo en ciertos aspectos del proyecto</a:t>
+            </a:r>
+          </a:p>
+          <a:p>
+            <a:r>
+              <a:rPr lang="es-ES" dirty="0"/>
+              <a:t>Coordinación a la hora de realizar las actividades del proyecto</a:t>
+            </a:r>
           </a:p>
         </p:txBody>
       </p:sp>
@@ -10619,13 +10533,6 @@
     <a:masterClrMapping/>
   </p:clrMapOvr>
   <p:transition advClick="0" advTm="20000"/>
-  <p:timing>
-    <p:tnLst>
-      <p:par>
-        <p:cTn id="1" dur="indefinite" restart="never" nodeType="tmRoot"/>
-      </p:par>
-    </p:tnLst>
-  </p:timing>
 </p:sld>
 </file>
 
@@ -10665,11 +10572,7 @@
           <a:p>
             <a:r>
               <a:rPr lang="es-ES" dirty="0"/>
-              <a:t>La </a:t>
-            </a:r>
-            <a:r>
-              <a:rPr lang="es-ES" dirty="0" smtClean="0"/>
-              <a:t>solución</a:t>
+              <a:t>La solución</a:t>
             </a:r>
             <a:endParaRPr lang="en-US" noProof="0" dirty="0"/>
           </a:p>
@@ -10691,7 +10594,7 @@
           <a:lstStyle/>
           <a:p>
             <a:r>
-              <a:rPr lang="es-ES_tradnl" smtClean="0"/>
+              <a:rPr lang="es-ES_tradnl"/>
               <a:t>2017-2018</a:t>
             </a:r>
             <a:endParaRPr lang="en-US" dirty="0"/>
@@ -10714,22 +10617,21 @@
           <a:lstStyle/>
           <a:p>
             <a:r>
-              <a:rPr lang="es-ES" dirty="0" smtClean="0"/>
+              <a:rPr lang="es-ES" dirty="0"/>
               <a:t>Algoritmo que calcula una dieta, en base a unos parámetros.</a:t>
             </a:r>
           </a:p>
           <a:p>
             <a:r>
-              <a:rPr lang="es-ES" dirty="0" smtClean="0"/>
+              <a:rPr lang="es-ES" dirty="0"/>
               <a:t>Se tienen en cuenta: alérgenos, datos personales del usuario y nutrientes consumidos, entre otros.</a:t>
             </a:r>
-            <a:endParaRPr lang="es-ES" dirty="0" smtClean="0"/>
-          </a:p>
-          <a:p>
-            <a:endParaRPr lang="es-ES" dirty="0" smtClean="0"/>
-          </a:p>
-          <a:p>
-            <a:endParaRPr lang="es-ES" dirty="0" smtClean="0"/>
+          </a:p>
+          <a:p>
+            <a:endParaRPr lang="es-ES" dirty="0"/>
+          </a:p>
+          <a:p>
+            <a:endParaRPr lang="es-ES" dirty="0"/>
           </a:p>
         </p:txBody>
       </p:sp>
@@ -10744,13 +10646,6 @@
     <a:masterClrMapping/>
   </p:clrMapOvr>
   <p:transition advClick="0" advTm="20000"/>
-  <p:timing>
-    <p:tnLst>
-      <p:par>
-        <p:cTn id="1" dur="indefinite" restart="never" nodeType="tmRoot"/>
-      </p:par>
-    </p:tnLst>
-  </p:timing>
 </p:sld>
 </file>
 
@@ -10793,11 +10688,11 @@
               <a:t>Actividades de Ing. </a:t>
             </a:r>
             <a:r>
-              <a:rPr lang="es-ES" dirty="0" err="1" smtClean="0"/>
+              <a:rPr lang="es-ES" dirty="0" err="1"/>
               <a:t>Sw</a:t>
             </a:r>
             <a:r>
-              <a:rPr lang="es-ES" dirty="0" smtClean="0"/>
+              <a:rPr lang="es-ES" dirty="0"/>
               <a:t> - Requisitos</a:t>
             </a:r>
             <a:endParaRPr lang="en-US" noProof="0" dirty="0"/>
@@ -10820,7 +10715,7 @@
           <a:lstStyle/>
           <a:p>
             <a:r>
-              <a:rPr lang="es-ES_tradnl" smtClean="0"/>
+              <a:rPr lang="es-ES_tradnl"/>
               <a:t>2017-2018</a:t>
             </a:r>
             <a:endParaRPr lang="en-US" dirty="0"/>
@@ -10843,22 +10738,21 @@
           <a:lstStyle/>
           <a:p>
             <a:r>
-              <a:rPr lang="es-ES" dirty="0" smtClean="0"/>
+              <a:rPr lang="es-ES" dirty="0"/>
               <a:t>El sistema debe ser capaz de dar una dieta (diaria o semanal) al usuario en un tiempo razonable.</a:t>
             </a:r>
           </a:p>
           <a:p>
             <a:r>
-              <a:rPr lang="es-ES" dirty="0" smtClean="0"/>
+              <a:rPr lang="es-ES" dirty="0"/>
               <a:t>El sistema debe de aprender de los comentarios del usuario</a:t>
             </a:r>
           </a:p>
           <a:p>
             <a:r>
-              <a:rPr lang="es-ES" dirty="0" smtClean="0"/>
+              <a:rPr lang="es-ES" dirty="0"/>
               <a:t>El sistema no puede recomendar alimentos que el usuario haya marcado como “alérgeno” o “alimento vetado”</a:t>
             </a:r>
-            <a:endParaRPr lang="es-ES" dirty="0"/>
           </a:p>
         </p:txBody>
       </p:sp>
@@ -10873,13 +10767,6 @@
     <a:masterClrMapping/>
   </p:clrMapOvr>
   <p:transition advClick="0" advTm="20000"/>
-  <p:timing>
-    <p:tnLst>
-      <p:par>
-        <p:cTn id="1" dur="indefinite" restart="never" nodeType="tmRoot"/>
-      </p:par>
-    </p:tnLst>
-  </p:timing>
 </p:sld>
 </file>
 
@@ -10925,11 +10812,7 @@
             </a:r>
             <a:r>
               <a:rPr lang="es-ES" dirty="0"/>
-              <a:t> - </a:t>
-            </a:r>
-            <a:r>
-              <a:rPr lang="es-ES" dirty="0" smtClean="0"/>
-              <a:t>Arquitectura</a:t>
+              <a:t> - Arquitectura</a:t>
             </a:r>
             <a:endParaRPr lang="en-US" noProof="0" dirty="0"/>
           </a:p>
@@ -10951,7 +10834,7 @@
           <a:lstStyle/>
           <a:p>
             <a:r>
-              <a:rPr lang="es-ES_tradnl" smtClean="0"/>
+              <a:rPr lang="es-ES_tradnl"/>
               <a:t>2017-2018</a:t>
             </a:r>
             <a:endParaRPr lang="en-US" dirty="0"/>
@@ -10973,6 +10856,32 @@
           <a:bodyPr/>
           <a:lstStyle/>
           <a:p>
+            <a:r>
+              <a:rPr lang="es-ES" dirty="0"/>
+              <a:t>Uso del MVC (Modelo, Vista, Controlador)</a:t>
+            </a:r>
+          </a:p>
+          <a:p>
+            <a:r>
+              <a:rPr lang="es-ES" dirty="0"/>
+              <a:t>Modelo: Proyecto en Java</a:t>
+            </a:r>
+          </a:p>
+          <a:p>
+            <a:r>
+              <a:rPr lang="es-ES" dirty="0"/>
+              <a:t>Controlador: PHP</a:t>
+            </a:r>
+          </a:p>
+          <a:p>
+            <a:r>
+              <a:rPr lang="es-ES" dirty="0"/>
+              <a:t>Vista: Página web </a:t>
+            </a:r>
+            <a:r>
+              <a:rPr lang="es-ES" dirty="0" err="1"/>
+              <a:t>html</a:t>
+            </a:r>
             <a:endParaRPr lang="es-ES" dirty="0"/>
           </a:p>
         </p:txBody>
@@ -10988,13 +10897,6 @@
     <a:masterClrMapping/>
   </p:clrMapOvr>
   <p:transition advClick="0" advTm="20000"/>
-  <p:timing>
-    <p:tnLst>
-      <p:par>
-        <p:cTn id="1" dur="indefinite" restart="never" nodeType="tmRoot"/>
-      </p:par>
-    </p:tnLst>
-  </p:timing>
 </p:sld>
 </file>
 
@@ -11027,7 +10929,9 @@
         </p:nvSpPr>
         <p:spPr/>
         <p:txBody>
-          <a:bodyPr/>
+          <a:bodyPr>
+            <a:normAutofit/>
+          </a:bodyPr>
           <a:lstStyle/>
           <a:p>
             <a:r>
@@ -11040,11 +10944,7 @@
             </a:r>
             <a:r>
               <a:rPr lang="es-ES" dirty="0"/>
-              <a:t> - </a:t>
-            </a:r>
-            <a:r>
-              <a:rPr lang="es-ES" dirty="0" smtClean="0"/>
-              <a:t>Principios</a:t>
+              <a:t> - Modelos</a:t>
             </a:r>
             <a:endParaRPr lang="en-US" noProof="0" dirty="0"/>
           </a:p>
@@ -11066,7 +10966,7 @@
           <a:lstStyle/>
           <a:p>
             <a:r>
-              <a:rPr lang="es-ES_tradnl" smtClean="0"/>
+              <a:rPr lang="es-ES_tradnl"/>
               <a:t>2017-2018</a:t>
             </a:r>
             <a:endParaRPr lang="en-US" dirty="0"/>
@@ -11089,29 +10989,22 @@
           <a:lstStyle/>
           <a:p>
             <a:r>
-              <a:rPr lang="es-ES" dirty="0" smtClean="0"/>
-              <a:t>Hacemos uso del Principio Abierto-Cerrado, el proyecto está abierto para expansión.</a:t>
-            </a:r>
-          </a:p>
-          <a:p>
-            <a:r>
-              <a:rPr lang="es-ES" dirty="0" smtClean="0"/>
-              <a:t>Posibles nuevas funcionalidades: Más parámetros para calcular la dieta, mostrar un precio aproximado al dar </a:t>
-            </a:r>
-            <a:r>
-              <a:rPr lang="es-ES" smtClean="0"/>
-              <a:t>la dieta</a:t>
-            </a:r>
-          </a:p>
-          <a:p>
-            <a:endParaRPr lang="es-ES" dirty="0"/>
+              <a:rPr lang="es-ES" dirty="0"/>
+              <a:t>Uso del patrón “Método plantilla”: Definimos una Interfaz para el Asistente de Dietas, y a raíz de ahí implementamos la clase</a:t>
+            </a:r>
+          </a:p>
+          <a:p>
+            <a:r>
+              <a:rPr lang="es-ES" dirty="0"/>
+              <a:t>Esto nos permite aplicar el principio de Abierto-Cerrado ya que se podrían expandir las funcionalidades de la IA fácilmente</a:t>
+            </a:r>
           </a:p>
         </p:txBody>
       </p:sp>
     </p:spTree>
     <p:extLst>
       <p:ext uri="{BB962C8B-B14F-4D97-AF65-F5344CB8AC3E}">
-        <p14:creationId xmlns:p14="http://schemas.microsoft.com/office/powerpoint/2010/main" val="883702286"/>
+        <p14:creationId xmlns:p14="http://schemas.microsoft.com/office/powerpoint/2010/main" val="1895953281"/>
       </p:ext>
     </p:extLst>
   </p:cSld>
@@ -11119,13 +11012,6 @@
     <a:masterClrMapping/>
   </p:clrMapOvr>
   <p:transition advClick="0" advTm="20000"/>
-  <p:timing>
-    <p:tnLst>
-      <p:par>
-        <p:cTn id="1" dur="indefinite" restart="never" nodeType="tmRoot"/>
-      </p:par>
-    </p:tnLst>
-  </p:timing>
 </p:sld>
 </file>
 

</xml_diff>

<commit_message>
Faltan 5 o 6 diapositivas del final
</commit_message>
<xml_diff>
--- a/docs/IntroIngSoft.PresentacionesFinales.pptx
+++ b/docs/IntroIngSoft.PresentacionesFinales.pptx
@@ -232,7 +232,7 @@
             <a:fld id="{0252902A-18E7-6440-A09B-741E2A2B6D42}" type="datetimeFigureOut">
               <a:rPr lang="es-ES" smtClean="0"/>
               <a:pPr/>
-              <a:t>03/06/2018</a:t>
+              <a:t>04/06/2018</a:t>
             </a:fld>
             <a:endParaRPr lang="es-ES"/>
           </a:p>
@@ -400,7 +400,7 @@
             <a:fld id="{4FA7064A-13DB-A34E-B31E-2D0AF10C5A7A}" type="datetimeFigureOut">
               <a:rPr lang="es-ES" smtClean="0"/>
               <a:pPr/>
-              <a:t>03/06/2018</a:t>
+              <a:t>04/06/2018</a:t>
             </a:fld>
             <a:endParaRPr lang="es-ES"/>
           </a:p>
@@ -8924,6 +8924,26 @@
           <a:bodyPr/>
           <a:lstStyle/>
           <a:p>
+            <a:r>
+              <a:rPr lang="es-ES" dirty="0"/>
+              <a:t>Ver que el asistente sugería dietas que tenían sentido</a:t>
+            </a:r>
+          </a:p>
+          <a:p>
+            <a:r>
+              <a:rPr lang="es-ES" dirty="0"/>
+              <a:t>Antes de desarrollar la Base de Datos: uso de un objeto </a:t>
+            </a:r>
+            <a:r>
+              <a:rPr lang="es-ES" dirty="0" err="1"/>
+              <a:t>mock</a:t>
+            </a:r>
+            <a:r>
+              <a:rPr lang="es-ES" dirty="0"/>
+              <a:t> para la Base de Datos</a:t>
+            </a:r>
+          </a:p>
+          <a:p>
             <a:endParaRPr lang="es-ES" dirty="0"/>
           </a:p>
         </p:txBody>
@@ -9020,6 +9040,12 @@
           <a:bodyPr/>
           <a:lstStyle/>
           <a:p>
+            <a:r>
+              <a:rPr lang="es-ES" dirty="0"/>
+              <a:t>Verificación y validación: Probando que el Asistente producía la dieta esperada al introducir un cierto tipo de Alimentos como “conjunto de posibles alimentos”</a:t>
+            </a:r>
+          </a:p>
+          <a:p>
             <a:endParaRPr lang="es-ES" dirty="0"/>
           </a:p>
         </p:txBody>
@@ -9118,6 +9144,36 @@
           <a:bodyPr/>
           <a:lstStyle/>
           <a:p>
+            <a:r>
+              <a:rPr lang="es-ES" dirty="0"/>
+              <a:t>Eclipse: Para desarrollar el proyecto Java</a:t>
+            </a:r>
+          </a:p>
+          <a:p>
+            <a:r>
+              <a:rPr lang="es-ES" dirty="0" err="1"/>
+              <a:t>Overleaf</a:t>
+            </a:r>
+            <a:r>
+              <a:rPr lang="es-ES" dirty="0"/>
+              <a:t>: Para desarrollar el .tex de la documentación </a:t>
+            </a:r>
+          </a:p>
+          <a:p>
+            <a:r>
+              <a:rPr lang="es-ES" dirty="0" err="1"/>
+              <a:t>Awardspace</a:t>
+            </a:r>
+            <a:r>
+              <a:rPr lang="es-ES" dirty="0"/>
+              <a:t>: Hosting de la web</a:t>
+            </a:r>
+          </a:p>
+          <a:p>
+            <a:r>
+              <a:rPr lang="es-ES" dirty="0" err="1"/>
+              <a:t>TomCat</a:t>
+            </a:r>
             <a:endParaRPr lang="es-ES" dirty="0"/>
           </a:p>
         </p:txBody>
@@ -9228,6 +9284,12 @@
             </a:r>
           </a:p>
           <a:p>
+            <a:r>
+              <a:rPr lang="es-ES" dirty="0"/>
+              <a:t>Documento .tex que recoge la documentación del proyecto </a:t>
+            </a:r>
+          </a:p>
+          <a:p>
             <a:pPr marL="0" indent="0">
               <a:buNone/>
             </a:pPr>
@@ -9329,6 +9391,21 @@
           <a:bodyPr/>
           <a:lstStyle/>
           <a:p>
+            <a:r>
+              <a:rPr lang="es-ES" dirty="0"/>
+              <a:t>Ciertas funcionalidades no han sido implementadas: dietas semanales, tener en cuenta más nutrientes al calcular la dieta</a:t>
+            </a:r>
+          </a:p>
+          <a:p>
+            <a:r>
+              <a:rPr lang="es-ES" dirty="0"/>
+              <a:t>No todos los parámetros se tienen en cuenta para calcular la dieta: Por ejemplo el sexo y estilo de vida</a:t>
+            </a:r>
+          </a:p>
+          <a:p>
+            <a:pPr marL="0" indent="0">
+              <a:buNone/>
+            </a:pPr>
             <a:endParaRPr lang="es-ES" dirty="0"/>
           </a:p>
         </p:txBody>

</xml_diff>